<commit_message>
Atualizando slide da Aula 01
</commit_message>
<xml_diff>
--- a/Aula 01 - Introdução/Introdução à Lógica de Programação.pptx
+++ b/Aula 01 - Introdução/Introdução à Lógica de Programação.pptx
@@ -17,10 +17,10 @@
     <p:sldId id="263" r:id="rId8"/>
     <p:sldId id="269" r:id="rId9"/>
     <p:sldId id="270" r:id="rId10"/>
-    <p:sldId id="271" r:id="rId11"/>
-    <p:sldId id="272" r:id="rId12"/>
-    <p:sldId id="273" r:id="rId13"/>
-    <p:sldId id="260" r:id="rId14"/>
+    <p:sldId id="275" r:id="rId11"/>
+    <p:sldId id="271" r:id="rId12"/>
+    <p:sldId id="272" r:id="rId13"/>
+    <p:sldId id="273" r:id="rId14"/>
   </p:sldIdLst>
   <p:sldSz cx="9144000" cy="6858000" type="screen4x3"/>
   <p:notesSz cx="6858000" cy="9144000"/>
@@ -1213,7 +1213,7 @@
           <a:p>
             <a:fld id="{25F0AA79-4FCC-074F-85E0-CEE218925B64}" type="datetimeFigureOut">
               <a:rPr lang="pt-BR" smtClean="0"/>
-              <a:t>29/04/2021</a:t>
+              <a:t>29/06/2022</a:t>
             </a:fld>
             <a:endParaRPr lang="pt-BR"/>
           </a:p>
@@ -1564,90 +1564,6 @@
 </p:notes>
 </file>
 
-<file path=ppt/notesSlides/notesSlide2.xml><?xml version="1.0" encoding="utf-8"?>
-<p:notes xmlns:a="http://schemas.openxmlformats.org/drawingml/2006/main" xmlns:r="http://schemas.openxmlformats.org/officeDocument/2006/relationships" xmlns:p="http://schemas.openxmlformats.org/presentationml/2006/main">
-  <p:cSld>
-    <p:spTree>
-      <p:nvGrpSpPr>
-        <p:cNvPr id="1" name=""/>
-        <p:cNvGrpSpPr/>
-        <p:nvPr/>
-      </p:nvGrpSpPr>
-      <p:grpSpPr>
-        <a:xfrm>
-          <a:off x="0" y="0"/>
-          <a:ext cx="0" cy="0"/>
-          <a:chOff x="0" y="0"/>
-          <a:chExt cx="0" cy="0"/>
-        </a:xfrm>
-      </p:grpSpPr>
-      <p:sp>
-        <p:nvSpPr>
-          <p:cNvPr id="2" name="Espaço Reservado para Imagem de Slide 1"/>
-          <p:cNvSpPr>
-            <a:spLocks noGrp="1" noRot="1" noChangeAspect="1"/>
-          </p:cNvSpPr>
-          <p:nvPr>
-            <p:ph type="sldImg"/>
-          </p:nvPr>
-        </p:nvSpPr>
-        <p:spPr/>
-      </p:sp>
-      <p:sp>
-        <p:nvSpPr>
-          <p:cNvPr id="3" name="Espaço Reservado para Anotações 2"/>
-          <p:cNvSpPr>
-            <a:spLocks noGrp="1"/>
-          </p:cNvSpPr>
-          <p:nvPr>
-            <p:ph type="body" idx="1"/>
-          </p:nvPr>
-        </p:nvSpPr>
-        <p:spPr/>
-        <p:txBody>
-          <a:bodyPr/>
-          <a:lstStyle/>
-          <a:p>
-            <a:endParaRPr lang="pt-BR" dirty="0"/>
-          </a:p>
-        </p:txBody>
-      </p:sp>
-      <p:sp>
-        <p:nvSpPr>
-          <p:cNvPr id="4" name="Espaço Reservado para Número de Slide 3"/>
-          <p:cNvSpPr>
-            <a:spLocks noGrp="1"/>
-          </p:cNvSpPr>
-          <p:nvPr>
-            <p:ph type="sldNum" sz="quarter" idx="5"/>
-          </p:nvPr>
-        </p:nvSpPr>
-        <p:spPr/>
-        <p:txBody>
-          <a:bodyPr/>
-          <a:lstStyle/>
-          <a:p>
-            <a:fld id="{E4012006-13B0-9343-974D-D1B6F7856FE8}" type="slidenum">
-              <a:rPr lang="pt-BR" smtClean="0"/>
-              <a:t>13</a:t>
-            </a:fld>
-            <a:endParaRPr lang="pt-BR"/>
-          </a:p>
-        </p:txBody>
-      </p:sp>
-    </p:spTree>
-    <p:extLst>
-      <p:ext uri="{BB962C8B-B14F-4D97-AF65-F5344CB8AC3E}">
-        <p14:creationId xmlns:p14="http://schemas.microsoft.com/office/powerpoint/2010/main" val="2932515428"/>
-      </p:ext>
-    </p:extLst>
-  </p:cSld>
-  <p:clrMapOvr>
-    <a:masterClrMapping/>
-  </p:clrMapOvr>
-</p:notes>
-</file>
-
 <file path=ppt/slideLayouts/slideLayout1.xml><?xml version="1.0" encoding="utf-8"?>
 <p:sldLayout xmlns:a="http://schemas.openxmlformats.org/drawingml/2006/main" xmlns:r="http://schemas.openxmlformats.org/officeDocument/2006/relationships" xmlns:p="http://schemas.openxmlformats.org/presentationml/2006/main" type="title" preserve="1">
   <p:cSld name="Slide de Título">
@@ -1779,7 +1695,7 @@
           <a:p>
             <a:fld id="{5F9344B4-9850-F84E-AF53-CD3E9423C711}" type="datetimeFigureOut">
               <a:rPr lang="pt-BR" smtClean="0"/>
-              <a:t>29/04/2021</a:t>
+              <a:t>29/06/2022</a:t>
             </a:fld>
             <a:endParaRPr lang="pt-BR"/>
           </a:p>
@@ -1949,7 +1865,7 @@
           <a:p>
             <a:fld id="{5F9344B4-9850-F84E-AF53-CD3E9423C711}" type="datetimeFigureOut">
               <a:rPr lang="pt-BR" smtClean="0"/>
-              <a:t>29/04/2021</a:t>
+              <a:t>29/06/2022</a:t>
             </a:fld>
             <a:endParaRPr lang="pt-BR"/>
           </a:p>
@@ -2129,7 +2045,7 @@
           <a:p>
             <a:fld id="{5F9344B4-9850-F84E-AF53-CD3E9423C711}" type="datetimeFigureOut">
               <a:rPr lang="pt-BR" smtClean="0"/>
-              <a:t>29/04/2021</a:t>
+              <a:t>29/06/2022</a:t>
             </a:fld>
             <a:endParaRPr lang="pt-BR"/>
           </a:p>
@@ -2299,7 +2215,7 @@
           <a:p>
             <a:fld id="{5F9344B4-9850-F84E-AF53-CD3E9423C711}" type="datetimeFigureOut">
               <a:rPr lang="pt-BR" smtClean="0"/>
-              <a:t>29/04/2021</a:t>
+              <a:t>29/06/2022</a:t>
             </a:fld>
             <a:endParaRPr lang="pt-BR"/>
           </a:p>
@@ -2543,7 +2459,7 @@
           <a:p>
             <a:fld id="{5F9344B4-9850-F84E-AF53-CD3E9423C711}" type="datetimeFigureOut">
               <a:rPr lang="pt-BR" smtClean="0"/>
-              <a:t>29/04/2021</a:t>
+              <a:t>29/06/2022</a:t>
             </a:fld>
             <a:endParaRPr lang="pt-BR"/>
           </a:p>
@@ -2775,7 +2691,7 @@
           <a:p>
             <a:fld id="{5F9344B4-9850-F84E-AF53-CD3E9423C711}" type="datetimeFigureOut">
               <a:rPr lang="pt-BR" smtClean="0"/>
-              <a:t>29/04/2021</a:t>
+              <a:t>29/06/2022</a:t>
             </a:fld>
             <a:endParaRPr lang="pt-BR"/>
           </a:p>
@@ -3142,7 +3058,7 @@
           <a:p>
             <a:fld id="{5F9344B4-9850-F84E-AF53-CD3E9423C711}" type="datetimeFigureOut">
               <a:rPr lang="pt-BR" smtClean="0"/>
-              <a:t>29/04/2021</a:t>
+              <a:t>29/06/2022</a:t>
             </a:fld>
             <a:endParaRPr lang="pt-BR"/>
           </a:p>
@@ -3260,7 +3176,7 @@
           <a:p>
             <a:fld id="{5F9344B4-9850-F84E-AF53-CD3E9423C711}" type="datetimeFigureOut">
               <a:rPr lang="pt-BR" smtClean="0"/>
-              <a:t>29/04/2021</a:t>
+              <a:t>29/06/2022</a:t>
             </a:fld>
             <a:endParaRPr lang="pt-BR"/>
           </a:p>
@@ -3355,7 +3271,7 @@
           <a:p>
             <a:fld id="{5F9344B4-9850-F84E-AF53-CD3E9423C711}" type="datetimeFigureOut">
               <a:rPr lang="pt-BR" smtClean="0"/>
-              <a:t>29/04/2021</a:t>
+              <a:t>29/06/2022</a:t>
             </a:fld>
             <a:endParaRPr lang="pt-BR"/>
           </a:p>
@@ -3632,7 +3548,7 @@
           <a:p>
             <a:fld id="{5F9344B4-9850-F84E-AF53-CD3E9423C711}" type="datetimeFigureOut">
               <a:rPr lang="pt-BR" smtClean="0"/>
-              <a:t>29/04/2021</a:t>
+              <a:t>29/06/2022</a:t>
             </a:fld>
             <a:endParaRPr lang="pt-BR"/>
           </a:p>
@@ -3889,7 +3805,7 @@
           <a:p>
             <a:fld id="{5F9344B4-9850-F84E-AF53-CD3E9423C711}" type="datetimeFigureOut">
               <a:rPr lang="pt-BR" smtClean="0"/>
-              <a:t>29/04/2021</a:t>
+              <a:t>29/06/2022</a:t>
             </a:fld>
             <a:endParaRPr lang="pt-BR"/>
           </a:p>
@@ -4102,7 +4018,7 @@
           <a:p>
             <a:fld id="{5F9344B4-9850-F84E-AF53-CD3E9423C711}" type="datetimeFigureOut">
               <a:rPr lang="pt-BR" smtClean="0"/>
-              <a:t>29/04/2021</a:t>
+              <a:t>29/06/2022</a:t>
             </a:fld>
             <a:endParaRPr lang="pt-BR"/>
           </a:p>
@@ -4616,6 +4532,60 @@
           </a:p>
         </p:txBody>
       </p:sp>
+      <p:sp>
+        <p:nvSpPr>
+          <p:cNvPr id="4" name="Retângulo 3">
+            <a:extLst>
+              <a:ext uri="{FF2B5EF4-FFF2-40B4-BE49-F238E27FC236}">
+                <a16:creationId xmlns:a16="http://schemas.microsoft.com/office/drawing/2014/main" id="{87A2A216-601A-2D89-B52A-BDF90D5D23CC}"/>
+              </a:ext>
+            </a:extLst>
+          </p:cNvPr>
+          <p:cNvSpPr/>
+          <p:nvPr/>
+        </p:nvSpPr>
+        <p:spPr>
+          <a:xfrm>
+            <a:off x="2868561" y="4710545"/>
+            <a:ext cx="3406878" cy="1734500"/>
+          </a:xfrm>
+          <a:prstGeom prst="rect">
+            <a:avLst/>
+          </a:prstGeom>
+          <a:solidFill>
+            <a:srgbClr val="003775"/>
+          </a:solidFill>
+          <a:ln>
+            <a:solidFill>
+              <a:srgbClr val="003775"/>
+            </a:solidFill>
+          </a:ln>
+        </p:spPr>
+        <p:style>
+          <a:lnRef idx="2">
+            <a:schemeClr val="accent1">
+              <a:shade val="50000"/>
+            </a:schemeClr>
+          </a:lnRef>
+          <a:fillRef idx="1">
+            <a:schemeClr val="accent1"/>
+          </a:fillRef>
+          <a:effectRef idx="0">
+            <a:schemeClr val="accent1"/>
+          </a:effectRef>
+          <a:fontRef idx="minor">
+            <a:schemeClr val="lt1"/>
+          </a:fontRef>
+        </p:style>
+        <p:txBody>
+          <a:bodyPr rtlCol="0" anchor="ctr"/>
+          <a:lstStyle/>
+          <a:p>
+            <a:pPr algn="ctr"/>
+            <a:endParaRPr lang="pt-BR"/>
+          </a:p>
+        </p:txBody>
+      </p:sp>
     </p:spTree>
     <p:extLst>
       <p:ext uri="{BB962C8B-B14F-4D97-AF65-F5344CB8AC3E}">
@@ -4630,6 +4600,479 @@
 </file>
 
 <file path=ppt/slides/slide10.xml><?xml version="1.0" encoding="utf-8"?>
+<p:sld xmlns:a="http://schemas.openxmlformats.org/drawingml/2006/main" xmlns:r="http://schemas.openxmlformats.org/officeDocument/2006/relationships" xmlns:p="http://schemas.openxmlformats.org/presentationml/2006/main">
+  <p:cSld>
+    <p:bg>
+      <p:bgPr>
+        <a:blipFill dpi="0" rotWithShape="1">
+          <a:blip r:embed="rId2">
+            <a:lum/>
+          </a:blip>
+          <a:srcRect/>
+          <a:stretch>
+            <a:fillRect/>
+          </a:stretch>
+        </a:blipFill>
+        <a:effectLst/>
+      </p:bgPr>
+    </p:bg>
+    <p:spTree>
+      <p:nvGrpSpPr>
+        <p:cNvPr id="1" name=""/>
+        <p:cNvGrpSpPr/>
+        <p:nvPr/>
+      </p:nvGrpSpPr>
+      <p:grpSpPr>
+        <a:xfrm>
+          <a:off x="0" y="0"/>
+          <a:ext cx="0" cy="0"/>
+          <a:chOff x="0" y="0"/>
+          <a:chExt cx="0" cy="0"/>
+        </a:xfrm>
+      </p:grpSpPr>
+      <p:sp>
+        <p:nvSpPr>
+          <p:cNvPr id="7" name="Título 1">
+            <a:extLst>
+              <a:ext uri="{FF2B5EF4-FFF2-40B4-BE49-F238E27FC236}">
+                <a16:creationId xmlns:a16="http://schemas.microsoft.com/office/drawing/2014/main" id="{489F5D36-DFC3-5141-9F8E-6FACABCF76D1}"/>
+              </a:ext>
+            </a:extLst>
+          </p:cNvPr>
+          <p:cNvSpPr txBox="1">
+            <a:spLocks/>
+          </p:cNvSpPr>
+          <p:nvPr/>
+        </p:nvSpPr>
+        <p:spPr>
+          <a:xfrm>
+            <a:off x="796637" y="471050"/>
+            <a:ext cx="6089071" cy="692729"/>
+          </a:xfrm>
+          <a:prstGeom prst="rect">
+            <a:avLst/>
+          </a:prstGeom>
+        </p:spPr>
+        <p:txBody>
+          <a:bodyPr vert="horz" lIns="91440" tIns="45720" rIns="91440" bIns="45720" rtlCol="0" anchor="ctr">
+            <a:noAutofit/>
+          </a:bodyPr>
+          <a:lstStyle>
+            <a:lvl1pPr algn="l" defTabSz="914400" rtl="0" eaLnBrk="1" latinLnBrk="0" hangingPunct="1">
+              <a:lnSpc>
+                <a:spcPct val="90000"/>
+              </a:lnSpc>
+              <a:spcBef>
+                <a:spcPct val="0"/>
+              </a:spcBef>
+              <a:buNone/>
+              <a:defRPr sz="4400" kern="1200">
+                <a:solidFill>
+                  <a:schemeClr val="tx1"/>
+                </a:solidFill>
+                <a:latin typeface="+mj-lt"/>
+                <a:ea typeface="+mj-ea"/>
+                <a:cs typeface="+mj-cs"/>
+              </a:defRPr>
+            </a:lvl1pPr>
+          </a:lstStyle>
+          <a:p>
+            <a:r>
+              <a:rPr lang="pt-BR" b="1" dirty="0">
+                <a:solidFill>
+                  <a:schemeClr val="bg2">
+                    <a:lumMod val="75000"/>
+                  </a:schemeClr>
+                </a:solidFill>
+                <a:latin typeface="+mn-lt"/>
+                <a:cs typeface="Calibri"/>
+              </a:rPr>
+              <a:t>Algoritmos</a:t>
+            </a:r>
+            <a:endParaRPr lang="pt-BR" b="1" dirty="0">
+              <a:solidFill>
+                <a:schemeClr val="bg2">
+                  <a:lumMod val="75000"/>
+                </a:schemeClr>
+              </a:solidFill>
+              <a:latin typeface="+mn-lt"/>
+              <a:cs typeface="Calibri" panose="020F0502020204030204" pitchFamily="34" charset="0"/>
+            </a:endParaRPr>
+          </a:p>
+        </p:txBody>
+      </p:sp>
+      <p:sp>
+        <p:nvSpPr>
+          <p:cNvPr id="8" name="Subtítulo 2">
+            <a:extLst>
+              <a:ext uri="{FF2B5EF4-FFF2-40B4-BE49-F238E27FC236}">
+                <a16:creationId xmlns:a16="http://schemas.microsoft.com/office/drawing/2014/main" id="{130BC05C-F296-DB41-B756-3F9967B721C0}"/>
+              </a:ext>
+            </a:extLst>
+          </p:cNvPr>
+          <p:cNvSpPr txBox="1">
+            <a:spLocks/>
+          </p:cNvSpPr>
+          <p:nvPr/>
+        </p:nvSpPr>
+        <p:spPr>
+          <a:xfrm>
+            <a:off x="796637" y="1163780"/>
+            <a:ext cx="6089071" cy="471049"/>
+          </a:xfrm>
+          <a:prstGeom prst="rect">
+            <a:avLst/>
+          </a:prstGeom>
+        </p:spPr>
+        <p:txBody>
+          <a:bodyPr vert="horz" lIns="91440" tIns="45720" rIns="91440" bIns="45720" rtlCol="0" anchor="t">
+            <a:normAutofit/>
+          </a:bodyPr>
+          <a:lstStyle>
+            <a:lvl1pPr marL="228600" indent="-228600" algn="l" defTabSz="914400" rtl="0" eaLnBrk="1" latinLnBrk="0" hangingPunct="1">
+              <a:lnSpc>
+                <a:spcPct val="90000"/>
+              </a:lnSpc>
+              <a:spcBef>
+                <a:spcPts val="1000"/>
+              </a:spcBef>
+              <a:buFont typeface="Arial" panose="020B0604020202020204" pitchFamily="34" charset="0"/>
+              <a:buChar char="•"/>
+              <a:defRPr sz="2800" kern="1200">
+                <a:solidFill>
+                  <a:schemeClr val="tx1"/>
+                </a:solidFill>
+                <a:latin typeface="+mn-lt"/>
+                <a:ea typeface="+mn-ea"/>
+                <a:cs typeface="+mn-cs"/>
+              </a:defRPr>
+            </a:lvl1pPr>
+            <a:lvl2pPr marL="685800" indent="-228600" algn="l" defTabSz="914400" rtl="0" eaLnBrk="1" latinLnBrk="0" hangingPunct="1">
+              <a:lnSpc>
+                <a:spcPct val="90000"/>
+              </a:lnSpc>
+              <a:spcBef>
+                <a:spcPts val="500"/>
+              </a:spcBef>
+              <a:buFont typeface="Arial" panose="020B0604020202020204" pitchFamily="34" charset="0"/>
+              <a:buChar char="•"/>
+              <a:defRPr sz="2400" kern="1200">
+                <a:solidFill>
+                  <a:schemeClr val="tx1"/>
+                </a:solidFill>
+                <a:latin typeface="+mn-lt"/>
+                <a:ea typeface="+mn-ea"/>
+                <a:cs typeface="+mn-cs"/>
+              </a:defRPr>
+            </a:lvl2pPr>
+            <a:lvl3pPr marL="1143000" indent="-228600" algn="l" defTabSz="914400" rtl="0" eaLnBrk="1" latinLnBrk="0" hangingPunct="1">
+              <a:lnSpc>
+                <a:spcPct val="90000"/>
+              </a:lnSpc>
+              <a:spcBef>
+                <a:spcPts val="500"/>
+              </a:spcBef>
+              <a:buFont typeface="Arial" panose="020B0604020202020204" pitchFamily="34" charset="0"/>
+              <a:buChar char="•"/>
+              <a:defRPr sz="2000" kern="1200">
+                <a:solidFill>
+                  <a:schemeClr val="tx1"/>
+                </a:solidFill>
+                <a:latin typeface="+mn-lt"/>
+                <a:ea typeface="+mn-ea"/>
+                <a:cs typeface="+mn-cs"/>
+              </a:defRPr>
+            </a:lvl3pPr>
+            <a:lvl4pPr marL="1600200" indent="-228600" algn="l" defTabSz="914400" rtl="0" eaLnBrk="1" latinLnBrk="0" hangingPunct="1">
+              <a:lnSpc>
+                <a:spcPct val="90000"/>
+              </a:lnSpc>
+              <a:spcBef>
+                <a:spcPts val="500"/>
+              </a:spcBef>
+              <a:buFont typeface="Arial" panose="020B0604020202020204" pitchFamily="34" charset="0"/>
+              <a:buChar char="•"/>
+              <a:defRPr sz="1800" kern="1200">
+                <a:solidFill>
+                  <a:schemeClr val="tx1"/>
+                </a:solidFill>
+                <a:latin typeface="+mn-lt"/>
+                <a:ea typeface="+mn-ea"/>
+                <a:cs typeface="+mn-cs"/>
+              </a:defRPr>
+            </a:lvl4pPr>
+            <a:lvl5pPr marL="2057400" indent="-228600" algn="l" defTabSz="914400" rtl="0" eaLnBrk="1" latinLnBrk="0" hangingPunct="1">
+              <a:lnSpc>
+                <a:spcPct val="90000"/>
+              </a:lnSpc>
+              <a:spcBef>
+                <a:spcPts val="500"/>
+              </a:spcBef>
+              <a:buFont typeface="Arial" panose="020B0604020202020204" pitchFamily="34" charset="0"/>
+              <a:buChar char="•"/>
+              <a:defRPr sz="1800" kern="1200">
+                <a:solidFill>
+                  <a:schemeClr val="tx1"/>
+                </a:solidFill>
+                <a:latin typeface="+mn-lt"/>
+                <a:ea typeface="+mn-ea"/>
+                <a:cs typeface="+mn-cs"/>
+              </a:defRPr>
+            </a:lvl5pPr>
+            <a:lvl6pPr marL="2514600" indent="-228600" algn="l" defTabSz="914400" rtl="0" eaLnBrk="1" latinLnBrk="0" hangingPunct="1">
+              <a:lnSpc>
+                <a:spcPct val="90000"/>
+              </a:lnSpc>
+              <a:spcBef>
+                <a:spcPts val="500"/>
+              </a:spcBef>
+              <a:buFont typeface="Arial" panose="020B0604020202020204" pitchFamily="34" charset="0"/>
+              <a:buChar char="•"/>
+              <a:defRPr sz="1800" kern="1200">
+                <a:solidFill>
+                  <a:schemeClr val="tx1"/>
+                </a:solidFill>
+                <a:latin typeface="+mn-lt"/>
+                <a:ea typeface="+mn-ea"/>
+                <a:cs typeface="+mn-cs"/>
+              </a:defRPr>
+            </a:lvl6pPr>
+            <a:lvl7pPr marL="2971800" indent="-228600" algn="l" defTabSz="914400" rtl="0" eaLnBrk="1" latinLnBrk="0" hangingPunct="1">
+              <a:lnSpc>
+                <a:spcPct val="90000"/>
+              </a:lnSpc>
+              <a:spcBef>
+                <a:spcPts val="500"/>
+              </a:spcBef>
+              <a:buFont typeface="Arial" panose="020B0604020202020204" pitchFamily="34" charset="0"/>
+              <a:buChar char="•"/>
+              <a:defRPr sz="1800" kern="1200">
+                <a:solidFill>
+                  <a:schemeClr val="tx1"/>
+                </a:solidFill>
+                <a:latin typeface="+mn-lt"/>
+                <a:ea typeface="+mn-ea"/>
+                <a:cs typeface="+mn-cs"/>
+              </a:defRPr>
+            </a:lvl7pPr>
+            <a:lvl8pPr marL="3429000" indent="-228600" algn="l" defTabSz="914400" rtl="0" eaLnBrk="1" latinLnBrk="0" hangingPunct="1">
+              <a:lnSpc>
+                <a:spcPct val="90000"/>
+              </a:lnSpc>
+              <a:spcBef>
+                <a:spcPts val="500"/>
+              </a:spcBef>
+              <a:buFont typeface="Arial" panose="020B0604020202020204" pitchFamily="34" charset="0"/>
+              <a:buChar char="•"/>
+              <a:defRPr sz="1800" kern="1200">
+                <a:solidFill>
+                  <a:schemeClr val="tx1"/>
+                </a:solidFill>
+                <a:latin typeface="+mn-lt"/>
+                <a:ea typeface="+mn-ea"/>
+                <a:cs typeface="+mn-cs"/>
+              </a:defRPr>
+            </a:lvl8pPr>
+            <a:lvl9pPr marL="3886200" indent="-228600" algn="l" defTabSz="914400" rtl="0" eaLnBrk="1" latinLnBrk="0" hangingPunct="1">
+              <a:lnSpc>
+                <a:spcPct val="90000"/>
+              </a:lnSpc>
+              <a:spcBef>
+                <a:spcPts val="500"/>
+              </a:spcBef>
+              <a:buFont typeface="Arial" panose="020B0604020202020204" pitchFamily="34" charset="0"/>
+              <a:buChar char="•"/>
+              <a:defRPr sz="1800" kern="1200">
+                <a:solidFill>
+                  <a:schemeClr val="tx1"/>
+                </a:solidFill>
+                <a:latin typeface="+mn-lt"/>
+                <a:ea typeface="+mn-ea"/>
+                <a:cs typeface="+mn-cs"/>
+              </a:defRPr>
+            </a:lvl9pPr>
+          </a:lstStyle>
+          <a:p>
+            <a:pPr marL="0" indent="0">
+              <a:buNone/>
+            </a:pPr>
+            <a:r>
+              <a:rPr lang="pt-BR" sz="2000" spc="300" dirty="0">
+                <a:solidFill>
+                  <a:schemeClr val="bg2">
+                    <a:lumMod val="75000"/>
+                  </a:schemeClr>
+                </a:solidFill>
+                <a:latin typeface="+mj-lt"/>
+              </a:rPr>
+              <a:t>REPRESENTAÇÃO DESCRITIVA - EXERCÍCIOS</a:t>
+            </a:r>
+            <a:endParaRPr lang="pt-BR" dirty="0">
+              <a:solidFill>
+                <a:schemeClr val="bg2">
+                  <a:lumMod val="75000"/>
+                </a:schemeClr>
+              </a:solidFill>
+            </a:endParaRPr>
+          </a:p>
+        </p:txBody>
+      </p:sp>
+      <p:sp>
+        <p:nvSpPr>
+          <p:cNvPr id="5" name="Retângulo 4">
+            <a:extLst>
+              <a:ext uri="{FF2B5EF4-FFF2-40B4-BE49-F238E27FC236}">
+                <a16:creationId xmlns:a16="http://schemas.microsoft.com/office/drawing/2014/main" id="{23062201-600A-4469-D5A6-CFB4F47CDECD}"/>
+              </a:ext>
+            </a:extLst>
+          </p:cNvPr>
+          <p:cNvSpPr/>
+          <p:nvPr/>
+        </p:nvSpPr>
+        <p:spPr>
+          <a:xfrm>
+            <a:off x="7243246" y="513952"/>
+            <a:ext cx="1458302" cy="944795"/>
+          </a:xfrm>
+          <a:prstGeom prst="rect">
+            <a:avLst/>
+          </a:prstGeom>
+          <a:solidFill>
+            <a:schemeClr val="bg1"/>
+          </a:solidFill>
+          <a:ln>
+            <a:solidFill>
+              <a:schemeClr val="bg1"/>
+            </a:solidFill>
+          </a:ln>
+        </p:spPr>
+        <p:style>
+          <a:lnRef idx="2">
+            <a:schemeClr val="accent1">
+              <a:shade val="50000"/>
+            </a:schemeClr>
+          </a:lnRef>
+          <a:fillRef idx="1">
+            <a:schemeClr val="accent1"/>
+          </a:fillRef>
+          <a:effectRef idx="0">
+            <a:schemeClr val="accent1"/>
+          </a:effectRef>
+          <a:fontRef idx="minor">
+            <a:schemeClr val="lt1"/>
+          </a:fontRef>
+        </p:style>
+        <p:txBody>
+          <a:bodyPr rtlCol="0" anchor="ctr"/>
+          <a:lstStyle/>
+          <a:p>
+            <a:pPr algn="ctr"/>
+            <a:endParaRPr lang="pt-BR"/>
+          </a:p>
+        </p:txBody>
+      </p:sp>
+      <p:pic>
+        <p:nvPicPr>
+          <p:cNvPr id="1026" name="Picture 2">
+            <a:extLst>
+              <a:ext uri="{FF2B5EF4-FFF2-40B4-BE49-F238E27FC236}">
+                <a16:creationId xmlns:a16="http://schemas.microsoft.com/office/drawing/2014/main" id="{3874A86F-9B9B-CEDE-D88C-06D1B0CFB538}"/>
+              </a:ext>
+            </a:extLst>
+          </p:cNvPr>
+          <p:cNvPicPr>
+            <a:picLocks noChangeAspect="1" noChangeArrowheads="1"/>
+          </p:cNvPicPr>
+          <p:nvPr/>
+        </p:nvPicPr>
+        <p:blipFill>
+          <a:blip r:embed="rId3">
+            <a:extLst>
+              <a:ext uri="{28A0092B-C50C-407E-A947-70E740481C1C}">
+                <a14:useLocalDpi xmlns:a14="http://schemas.microsoft.com/office/drawing/2010/main" val="0"/>
+              </a:ext>
+            </a:extLst>
+          </a:blip>
+          <a:srcRect/>
+          <a:stretch>
+            <a:fillRect/>
+          </a:stretch>
+        </p:blipFill>
+        <p:spPr bwMode="auto">
+          <a:xfrm>
+            <a:off x="1364225" y="2322078"/>
+            <a:ext cx="6415549" cy="4021970"/>
+          </a:xfrm>
+          <a:prstGeom prst="rect">
+            <a:avLst/>
+          </a:prstGeom>
+          <a:noFill/>
+          <a:extLst>
+            <a:ext uri="{909E8E84-426E-40DD-AFC4-6F175D3DCCD1}">
+              <a14:hiddenFill xmlns:a14="http://schemas.microsoft.com/office/drawing/2010/main">
+                <a:solidFill>
+                  <a:srgbClr val="FFFFFF"/>
+                </a:solidFill>
+              </a14:hiddenFill>
+            </a:ext>
+          </a:extLst>
+        </p:spPr>
+      </p:pic>
+      <p:sp>
+        <p:nvSpPr>
+          <p:cNvPr id="2" name="CaixaDeTexto 1">
+            <a:extLst>
+              <a:ext uri="{FF2B5EF4-FFF2-40B4-BE49-F238E27FC236}">
+                <a16:creationId xmlns:a16="http://schemas.microsoft.com/office/drawing/2014/main" id="{DA2304A2-AB9F-C57C-FA37-EB47E7E828B2}"/>
+              </a:ext>
+            </a:extLst>
+          </p:cNvPr>
+          <p:cNvSpPr txBox="1"/>
+          <p:nvPr/>
+        </p:nvSpPr>
+        <p:spPr>
+          <a:xfrm>
+            <a:off x="796637" y="1970715"/>
+            <a:ext cx="7359221" cy="646331"/>
+          </a:xfrm>
+          <a:prstGeom prst="rect">
+            <a:avLst/>
+          </a:prstGeom>
+          <a:noFill/>
+        </p:spPr>
+        <p:txBody>
+          <a:bodyPr wrap="square" rtlCol="0">
+            <a:spAutoFit/>
+          </a:bodyPr>
+          <a:lstStyle/>
+          <a:p>
+            <a:r>
+              <a:rPr lang="pt-BR" dirty="0">
+                <a:solidFill>
+                  <a:schemeClr val="bg2">
+                    <a:lumMod val="75000"/>
+                  </a:schemeClr>
+                </a:solidFill>
+              </a:rPr>
+              <a:t>Represente de maneira descritiva os movimentos necessários para chegar ao destino.</a:t>
+            </a:r>
+          </a:p>
+        </p:txBody>
+      </p:sp>
+    </p:spTree>
+    <p:extLst>
+      <p:ext uri="{BB962C8B-B14F-4D97-AF65-F5344CB8AC3E}">
+        <p14:creationId xmlns:p14="http://schemas.microsoft.com/office/powerpoint/2010/main" val="3547308534"/>
+      </p:ext>
+    </p:extLst>
+  </p:cSld>
+  <p:clrMapOvr>
+    <a:masterClrMapping/>
+  </p:clrMapOvr>
+</p:sld>
+</file>
+
+<file path=ppt/slides/slide11.xml><?xml version="1.0" encoding="utf-8"?>
 <p:sld xmlns:a="http://schemas.openxmlformats.org/drawingml/2006/main" xmlns:r="http://schemas.openxmlformats.org/officeDocument/2006/relationships" xmlns:p="http://schemas.openxmlformats.org/presentationml/2006/main">
   <p:cSld>
     <p:bg>
@@ -5448,6 +5891,60 @@
           </a:p>
         </p:txBody>
       </p:sp>
+      <p:sp>
+        <p:nvSpPr>
+          <p:cNvPr id="17" name="Retângulo 16">
+            <a:extLst>
+              <a:ext uri="{FF2B5EF4-FFF2-40B4-BE49-F238E27FC236}">
+                <a16:creationId xmlns:a16="http://schemas.microsoft.com/office/drawing/2014/main" id="{6891C3E8-AC00-BC5F-F858-4560BD42673E}"/>
+              </a:ext>
+            </a:extLst>
+          </p:cNvPr>
+          <p:cNvSpPr/>
+          <p:nvPr/>
+        </p:nvSpPr>
+        <p:spPr>
+          <a:xfrm>
+            <a:off x="7243246" y="513952"/>
+            <a:ext cx="1458302" cy="944795"/>
+          </a:xfrm>
+          <a:prstGeom prst="rect">
+            <a:avLst/>
+          </a:prstGeom>
+          <a:solidFill>
+            <a:schemeClr val="bg1"/>
+          </a:solidFill>
+          <a:ln>
+            <a:solidFill>
+              <a:schemeClr val="bg1"/>
+            </a:solidFill>
+          </a:ln>
+        </p:spPr>
+        <p:style>
+          <a:lnRef idx="2">
+            <a:schemeClr val="accent1">
+              <a:shade val="50000"/>
+            </a:schemeClr>
+          </a:lnRef>
+          <a:fillRef idx="1">
+            <a:schemeClr val="accent1"/>
+          </a:fillRef>
+          <a:effectRef idx="0">
+            <a:schemeClr val="accent1"/>
+          </a:effectRef>
+          <a:fontRef idx="minor">
+            <a:schemeClr val="lt1"/>
+          </a:fontRef>
+        </p:style>
+        <p:txBody>
+          <a:bodyPr rtlCol="0" anchor="ctr"/>
+          <a:lstStyle/>
+          <a:p>
+            <a:pPr algn="ctr"/>
+            <a:endParaRPr lang="pt-BR"/>
+          </a:p>
+        </p:txBody>
+      </p:sp>
     </p:spTree>
     <p:extLst>
       <p:ext uri="{BB962C8B-B14F-4D97-AF65-F5344CB8AC3E}">
@@ -5461,7 +5958,7 @@
 </p:sld>
 </file>
 
-<file path=ppt/slides/slide11.xml><?xml version="1.0" encoding="utf-8"?>
+<file path=ppt/slides/slide12.xml><?xml version="1.0" encoding="utf-8"?>
 <p:sld xmlns:a="http://schemas.openxmlformats.org/drawingml/2006/main" xmlns:r="http://schemas.openxmlformats.org/officeDocument/2006/relationships" xmlns:p="http://schemas.openxmlformats.org/presentationml/2006/main">
   <p:cSld>
     <p:bg>
@@ -6136,6 +6633,60 @@
           </a:p>
         </p:txBody>
       </p:sp>
+      <p:sp>
+        <p:nvSpPr>
+          <p:cNvPr id="5" name="Retângulo 4">
+            <a:extLst>
+              <a:ext uri="{FF2B5EF4-FFF2-40B4-BE49-F238E27FC236}">
+                <a16:creationId xmlns:a16="http://schemas.microsoft.com/office/drawing/2014/main" id="{7FEDD0D2-CC88-0DC7-3BB5-3B171790C81B}"/>
+              </a:ext>
+            </a:extLst>
+          </p:cNvPr>
+          <p:cNvSpPr/>
+          <p:nvPr/>
+        </p:nvSpPr>
+        <p:spPr>
+          <a:xfrm>
+            <a:off x="7243246" y="513952"/>
+            <a:ext cx="1458302" cy="944795"/>
+          </a:xfrm>
+          <a:prstGeom prst="rect">
+            <a:avLst/>
+          </a:prstGeom>
+          <a:solidFill>
+            <a:schemeClr val="bg1"/>
+          </a:solidFill>
+          <a:ln>
+            <a:solidFill>
+              <a:schemeClr val="bg1"/>
+            </a:solidFill>
+          </a:ln>
+        </p:spPr>
+        <p:style>
+          <a:lnRef idx="2">
+            <a:schemeClr val="accent1">
+              <a:shade val="50000"/>
+            </a:schemeClr>
+          </a:lnRef>
+          <a:fillRef idx="1">
+            <a:schemeClr val="accent1"/>
+          </a:fillRef>
+          <a:effectRef idx="0">
+            <a:schemeClr val="accent1"/>
+          </a:effectRef>
+          <a:fontRef idx="minor">
+            <a:schemeClr val="lt1"/>
+          </a:fontRef>
+        </p:style>
+        <p:txBody>
+          <a:bodyPr rtlCol="0" anchor="ctr"/>
+          <a:lstStyle/>
+          <a:p>
+            <a:pPr algn="ctr"/>
+            <a:endParaRPr lang="pt-BR"/>
+          </a:p>
+        </p:txBody>
+      </p:sp>
     </p:spTree>
     <p:extLst>
       <p:ext uri="{BB962C8B-B14F-4D97-AF65-F5344CB8AC3E}">
@@ -6149,7 +6700,7 @@
 </p:sld>
 </file>
 
-<file path=ppt/slides/slide12.xml><?xml version="1.0" encoding="utf-8"?>
+<file path=ppt/slides/slide13.xml><?xml version="1.0" encoding="utf-8"?>
 <p:sld xmlns:a="http://schemas.openxmlformats.org/drawingml/2006/main" xmlns:r="http://schemas.openxmlformats.org/officeDocument/2006/relationships" xmlns:p="http://schemas.openxmlformats.org/presentationml/2006/main">
   <p:cSld>
     <p:bg>
@@ -6635,262 +7186,64 @@
           </a:prstGeom>
         </p:spPr>
       </p:pic>
-    </p:spTree>
-    <p:extLst>
-      <p:ext uri="{BB962C8B-B14F-4D97-AF65-F5344CB8AC3E}">
-        <p14:creationId xmlns:p14="http://schemas.microsoft.com/office/powerpoint/2010/main" val="3624970870"/>
-      </p:ext>
-    </p:extLst>
-  </p:cSld>
-  <p:clrMapOvr>
-    <a:masterClrMapping/>
-  </p:clrMapOvr>
-</p:sld>
-</file>
-
-<file path=ppt/slides/slide13.xml><?xml version="1.0" encoding="utf-8"?>
-<p:sld xmlns:a="http://schemas.openxmlformats.org/drawingml/2006/main" xmlns:r="http://schemas.openxmlformats.org/officeDocument/2006/relationships" xmlns:p="http://schemas.openxmlformats.org/presentationml/2006/main">
-  <p:cSld>
-    <p:bg>
-      <p:bgPr>
-        <a:blipFill dpi="0" rotWithShape="1">
-          <a:blip r:embed="rId3">
-            <a:lum/>
-          </a:blip>
-          <a:srcRect/>
-          <a:stretch>
-            <a:fillRect/>
-          </a:stretch>
-        </a:blipFill>
-        <a:effectLst/>
-      </p:bgPr>
-    </p:bg>
-    <p:spTree>
-      <p:nvGrpSpPr>
-        <p:cNvPr id="1" name=""/>
-        <p:cNvGrpSpPr/>
-        <p:nvPr/>
-      </p:nvGrpSpPr>
-      <p:grpSpPr>
-        <a:xfrm>
-          <a:off x="0" y="0"/>
-          <a:ext cx="0" cy="0"/>
-          <a:chOff x="0" y="0"/>
-          <a:chExt cx="0" cy="0"/>
-        </a:xfrm>
-      </p:grpSpPr>
       <p:sp>
         <p:nvSpPr>
-          <p:cNvPr id="5" name="Subtítulo 2">
+          <p:cNvPr id="9" name="Retângulo 8">
             <a:extLst>
               <a:ext uri="{FF2B5EF4-FFF2-40B4-BE49-F238E27FC236}">
-                <a16:creationId xmlns:a16="http://schemas.microsoft.com/office/drawing/2014/main" id="{98FABF29-7F22-FF4C-A68A-E66B42737331}"/>
+                <a16:creationId xmlns:a16="http://schemas.microsoft.com/office/drawing/2014/main" id="{EFB8882B-BCDC-BF1D-47C2-3A1DA5047CF7}"/>
               </a:ext>
             </a:extLst>
           </p:cNvPr>
-          <p:cNvSpPr txBox="1">
-            <a:spLocks/>
-          </p:cNvSpPr>
+          <p:cNvSpPr/>
           <p:nvPr/>
         </p:nvSpPr>
         <p:spPr>
           <a:xfrm>
-            <a:off x="1143000" y="4571857"/>
-            <a:ext cx="6858000" cy="817561"/>
+            <a:off x="7243246" y="513952"/>
+            <a:ext cx="1458302" cy="944795"/>
           </a:xfrm>
           <a:prstGeom prst="rect">
             <a:avLst/>
           </a:prstGeom>
+          <a:solidFill>
+            <a:schemeClr val="bg1"/>
+          </a:solidFill>
+          <a:ln>
+            <a:solidFill>
+              <a:schemeClr val="bg1"/>
+            </a:solidFill>
+          </a:ln>
         </p:spPr>
+        <p:style>
+          <a:lnRef idx="2">
+            <a:schemeClr val="accent1">
+              <a:shade val="50000"/>
+            </a:schemeClr>
+          </a:lnRef>
+          <a:fillRef idx="1">
+            <a:schemeClr val="accent1"/>
+          </a:fillRef>
+          <a:effectRef idx="0">
+            <a:schemeClr val="accent1"/>
+          </a:effectRef>
+          <a:fontRef idx="minor">
+            <a:schemeClr val="lt1"/>
+          </a:fontRef>
+        </p:style>
         <p:txBody>
-          <a:bodyPr vert="horz" lIns="91440" tIns="45720" rIns="91440" bIns="45720" rtlCol="0">
-            <a:normAutofit/>
-          </a:bodyPr>
-          <a:lstStyle>
-            <a:lvl1pPr marL="228600" indent="-228600" algn="l" defTabSz="914400" rtl="0" eaLnBrk="1" latinLnBrk="0" hangingPunct="1">
-              <a:lnSpc>
-                <a:spcPct val="90000"/>
-              </a:lnSpc>
-              <a:spcBef>
-                <a:spcPts val="1000"/>
-              </a:spcBef>
-              <a:buFont typeface="Arial" panose="020B0604020202020204" pitchFamily="34" charset="0"/>
-              <a:buChar char="•"/>
-              <a:defRPr sz="2800" kern="1200">
-                <a:solidFill>
-                  <a:schemeClr val="tx1"/>
-                </a:solidFill>
-                <a:latin typeface="+mn-lt"/>
-                <a:ea typeface="+mn-ea"/>
-                <a:cs typeface="+mn-cs"/>
-              </a:defRPr>
-            </a:lvl1pPr>
-            <a:lvl2pPr marL="685800" indent="-228600" algn="l" defTabSz="914400" rtl="0" eaLnBrk="1" latinLnBrk="0" hangingPunct="1">
-              <a:lnSpc>
-                <a:spcPct val="90000"/>
-              </a:lnSpc>
-              <a:spcBef>
-                <a:spcPts val="500"/>
-              </a:spcBef>
-              <a:buFont typeface="Arial" panose="020B0604020202020204" pitchFamily="34" charset="0"/>
-              <a:buChar char="•"/>
-              <a:defRPr sz="2400" kern="1200">
-                <a:solidFill>
-                  <a:schemeClr val="tx1"/>
-                </a:solidFill>
-                <a:latin typeface="+mn-lt"/>
-                <a:ea typeface="+mn-ea"/>
-                <a:cs typeface="+mn-cs"/>
-              </a:defRPr>
-            </a:lvl2pPr>
-            <a:lvl3pPr marL="1143000" indent="-228600" algn="l" defTabSz="914400" rtl="0" eaLnBrk="1" latinLnBrk="0" hangingPunct="1">
-              <a:lnSpc>
-                <a:spcPct val="90000"/>
-              </a:lnSpc>
-              <a:spcBef>
-                <a:spcPts val="500"/>
-              </a:spcBef>
-              <a:buFont typeface="Arial" panose="020B0604020202020204" pitchFamily="34" charset="0"/>
-              <a:buChar char="•"/>
-              <a:defRPr sz="2000" kern="1200">
-                <a:solidFill>
-                  <a:schemeClr val="tx1"/>
-                </a:solidFill>
-                <a:latin typeface="+mn-lt"/>
-                <a:ea typeface="+mn-ea"/>
-                <a:cs typeface="+mn-cs"/>
-              </a:defRPr>
-            </a:lvl3pPr>
-            <a:lvl4pPr marL="1600200" indent="-228600" algn="l" defTabSz="914400" rtl="0" eaLnBrk="1" latinLnBrk="0" hangingPunct="1">
-              <a:lnSpc>
-                <a:spcPct val="90000"/>
-              </a:lnSpc>
-              <a:spcBef>
-                <a:spcPts val="500"/>
-              </a:spcBef>
-              <a:buFont typeface="Arial" panose="020B0604020202020204" pitchFamily="34" charset="0"/>
-              <a:buChar char="•"/>
-              <a:defRPr sz="1800" kern="1200">
-                <a:solidFill>
-                  <a:schemeClr val="tx1"/>
-                </a:solidFill>
-                <a:latin typeface="+mn-lt"/>
-                <a:ea typeface="+mn-ea"/>
-                <a:cs typeface="+mn-cs"/>
-              </a:defRPr>
-            </a:lvl4pPr>
-            <a:lvl5pPr marL="2057400" indent="-228600" algn="l" defTabSz="914400" rtl="0" eaLnBrk="1" latinLnBrk="0" hangingPunct="1">
-              <a:lnSpc>
-                <a:spcPct val="90000"/>
-              </a:lnSpc>
-              <a:spcBef>
-                <a:spcPts val="500"/>
-              </a:spcBef>
-              <a:buFont typeface="Arial" panose="020B0604020202020204" pitchFamily="34" charset="0"/>
-              <a:buChar char="•"/>
-              <a:defRPr sz="1800" kern="1200">
-                <a:solidFill>
-                  <a:schemeClr val="tx1"/>
-                </a:solidFill>
-                <a:latin typeface="+mn-lt"/>
-                <a:ea typeface="+mn-ea"/>
-                <a:cs typeface="+mn-cs"/>
-              </a:defRPr>
-            </a:lvl5pPr>
-            <a:lvl6pPr marL="2514600" indent="-228600" algn="l" defTabSz="914400" rtl="0" eaLnBrk="1" latinLnBrk="0" hangingPunct="1">
-              <a:lnSpc>
-                <a:spcPct val="90000"/>
-              </a:lnSpc>
-              <a:spcBef>
-                <a:spcPts val="500"/>
-              </a:spcBef>
-              <a:buFont typeface="Arial" panose="020B0604020202020204" pitchFamily="34" charset="0"/>
-              <a:buChar char="•"/>
-              <a:defRPr sz="1800" kern="1200">
-                <a:solidFill>
-                  <a:schemeClr val="tx1"/>
-                </a:solidFill>
-                <a:latin typeface="+mn-lt"/>
-                <a:ea typeface="+mn-ea"/>
-                <a:cs typeface="+mn-cs"/>
-              </a:defRPr>
-            </a:lvl6pPr>
-            <a:lvl7pPr marL="2971800" indent="-228600" algn="l" defTabSz="914400" rtl="0" eaLnBrk="1" latinLnBrk="0" hangingPunct="1">
-              <a:lnSpc>
-                <a:spcPct val="90000"/>
-              </a:lnSpc>
-              <a:spcBef>
-                <a:spcPts val="500"/>
-              </a:spcBef>
-              <a:buFont typeface="Arial" panose="020B0604020202020204" pitchFamily="34" charset="0"/>
-              <a:buChar char="•"/>
-              <a:defRPr sz="1800" kern="1200">
-                <a:solidFill>
-                  <a:schemeClr val="tx1"/>
-                </a:solidFill>
-                <a:latin typeface="+mn-lt"/>
-                <a:ea typeface="+mn-ea"/>
-                <a:cs typeface="+mn-cs"/>
-              </a:defRPr>
-            </a:lvl7pPr>
-            <a:lvl8pPr marL="3429000" indent="-228600" algn="l" defTabSz="914400" rtl="0" eaLnBrk="1" latinLnBrk="0" hangingPunct="1">
-              <a:lnSpc>
-                <a:spcPct val="90000"/>
-              </a:lnSpc>
-              <a:spcBef>
-                <a:spcPts val="500"/>
-              </a:spcBef>
-              <a:buFont typeface="Arial" panose="020B0604020202020204" pitchFamily="34" charset="0"/>
-              <a:buChar char="•"/>
-              <a:defRPr sz="1800" kern="1200">
-                <a:solidFill>
-                  <a:schemeClr val="tx1"/>
-                </a:solidFill>
-                <a:latin typeface="+mn-lt"/>
-                <a:ea typeface="+mn-ea"/>
-                <a:cs typeface="+mn-cs"/>
-              </a:defRPr>
-            </a:lvl8pPr>
-            <a:lvl9pPr marL="3886200" indent="-228600" algn="l" defTabSz="914400" rtl="0" eaLnBrk="1" latinLnBrk="0" hangingPunct="1">
-              <a:lnSpc>
-                <a:spcPct val="90000"/>
-              </a:lnSpc>
-              <a:spcBef>
-                <a:spcPts val="500"/>
-              </a:spcBef>
-              <a:buFont typeface="Arial" panose="020B0604020202020204" pitchFamily="34" charset="0"/>
-              <a:buChar char="•"/>
-              <a:defRPr sz="1800" kern="1200">
-                <a:solidFill>
-                  <a:schemeClr val="tx1"/>
-                </a:solidFill>
-                <a:latin typeface="+mn-lt"/>
-                <a:ea typeface="+mn-ea"/>
-                <a:cs typeface="+mn-cs"/>
-              </a:defRPr>
-            </a:lvl9pPr>
-          </a:lstStyle>
-          <a:p>
-            <a:pPr marL="0" indent="0" algn="ctr">
-              <a:buNone/>
-            </a:pPr>
-            <a:r>
-              <a:rPr lang="pt-BR" sz="2000" b="1" spc="300" dirty="0">
-                <a:solidFill>
-                  <a:srgbClr val="ED8B00"/>
-                </a:solidFill>
-                <a:latin typeface="Calibri" panose="020F0502020204030204" pitchFamily="34" charset="0"/>
-                <a:cs typeface="Calibri" panose="020F0502020204030204" pitchFamily="34" charset="0"/>
-              </a:rPr>
-              <a:t>sc.senac.br</a:t>
-            </a:r>
+          <a:bodyPr rtlCol="0" anchor="ctr"/>
+          <a:lstStyle/>
+          <a:p>
+            <a:pPr algn="ctr"/>
+            <a:endParaRPr lang="pt-BR"/>
           </a:p>
         </p:txBody>
       </p:sp>
     </p:spTree>
     <p:extLst>
       <p:ext uri="{BB962C8B-B14F-4D97-AF65-F5344CB8AC3E}">
-        <p14:creationId xmlns:p14="http://schemas.microsoft.com/office/powerpoint/2010/main" val="2692719235"/>
+        <p14:creationId xmlns:p14="http://schemas.microsoft.com/office/powerpoint/2010/main" val="3624970870"/>
       </p:ext>
     </p:extLst>
   </p:cSld>
@@ -7135,12 +7488,6 @@
               </a:rPr>
               <a:t> são os componentes eletrônicos do nosso dispositivo.</a:t>
             </a:r>
-            <a:endParaRPr lang="pt-BR" sz="2400">
-              <a:solidFill>
-                <a:srgbClr val="FFFFFF"/>
-              </a:solidFill>
-              <a:cs typeface="Calibri Light" panose="020F0302020204030204"/>
-            </a:endParaRPr>
           </a:p>
           <a:p>
             <a:pPr marL="342900" indent="-342900" algn="just">
@@ -7220,24 +7567,14 @@
               <a:t>Sistema Operacional </a:t>
             </a:r>
             <a:r>
-              <a:rPr lang="pt-BR" sz="2400">
+              <a:rPr lang="pt-BR" sz="2400" dirty="0">
                 <a:solidFill>
                   <a:schemeClr val="bg1"/>
                 </a:solidFill>
                 <a:ea typeface="+mj-lt"/>
                 <a:cs typeface="+mj-lt"/>
               </a:rPr>
-              <a:t>é um software cuja função é </a:t>
-            </a:r>
-            <a:r>
-              <a:rPr lang="pt-BR" sz="2400" dirty="0">
-                <a:solidFill>
-                  <a:schemeClr val="bg1"/>
-                </a:solidFill>
-                <a:ea typeface="+mj-lt"/>
-                <a:cs typeface="+mj-lt"/>
-              </a:rPr>
-              <a:t>gerenciar os recursos do sistema computacional.</a:t>
+              <a:t>é um software cuja função é gerenciar os recursos do sistema computacional.</a:t>
             </a:r>
           </a:p>
           <a:p>
@@ -7416,6 +7753,60 @@
               </a:rPr>
               <a:t>CONCEITOS</a:t>
             </a:r>
+          </a:p>
+        </p:txBody>
+      </p:sp>
+      <p:sp>
+        <p:nvSpPr>
+          <p:cNvPr id="2" name="Retângulo 1">
+            <a:extLst>
+              <a:ext uri="{FF2B5EF4-FFF2-40B4-BE49-F238E27FC236}">
+                <a16:creationId xmlns:a16="http://schemas.microsoft.com/office/drawing/2014/main" id="{8344CBFC-9E13-E9E5-0E78-EC94C84F7FFF}"/>
+              </a:ext>
+            </a:extLst>
+          </p:cNvPr>
+          <p:cNvSpPr/>
+          <p:nvPr/>
+        </p:nvSpPr>
+        <p:spPr>
+          <a:xfrm>
+            <a:off x="7123471" y="416458"/>
+            <a:ext cx="1607574" cy="1058381"/>
+          </a:xfrm>
+          <a:prstGeom prst="rect">
+            <a:avLst/>
+          </a:prstGeom>
+          <a:solidFill>
+            <a:srgbClr val="003775"/>
+          </a:solidFill>
+          <a:ln>
+            <a:solidFill>
+              <a:srgbClr val="003775"/>
+            </a:solidFill>
+          </a:ln>
+        </p:spPr>
+        <p:style>
+          <a:lnRef idx="2">
+            <a:schemeClr val="accent1">
+              <a:shade val="50000"/>
+            </a:schemeClr>
+          </a:lnRef>
+          <a:fillRef idx="1">
+            <a:schemeClr val="accent1"/>
+          </a:fillRef>
+          <a:effectRef idx="0">
+            <a:schemeClr val="accent1"/>
+          </a:effectRef>
+          <a:fontRef idx="minor">
+            <a:schemeClr val="lt1"/>
+          </a:fontRef>
+        </p:style>
+        <p:txBody>
+          <a:bodyPr rtlCol="0" anchor="ctr"/>
+          <a:lstStyle/>
+          <a:p>
+            <a:pPr algn="ctr"/>
+            <a:endParaRPr lang="pt-BR"/>
           </a:p>
         </p:txBody>
       </p:sp>
@@ -8613,6 +9004,60 @@
           </a:p>
         </p:txBody>
       </p:sp>
+      <p:sp>
+        <p:nvSpPr>
+          <p:cNvPr id="2" name="Retângulo 1">
+            <a:extLst>
+              <a:ext uri="{FF2B5EF4-FFF2-40B4-BE49-F238E27FC236}">
+                <a16:creationId xmlns:a16="http://schemas.microsoft.com/office/drawing/2014/main" id="{57126522-3969-3589-53A9-D3FD465634A4}"/>
+              </a:ext>
+            </a:extLst>
+          </p:cNvPr>
+          <p:cNvSpPr/>
+          <p:nvPr/>
+        </p:nvSpPr>
+        <p:spPr>
+          <a:xfrm>
+            <a:off x="7243246" y="513952"/>
+            <a:ext cx="1458302" cy="944795"/>
+          </a:xfrm>
+          <a:prstGeom prst="rect">
+            <a:avLst/>
+          </a:prstGeom>
+          <a:solidFill>
+            <a:schemeClr val="bg1"/>
+          </a:solidFill>
+          <a:ln>
+            <a:solidFill>
+              <a:schemeClr val="bg1"/>
+            </a:solidFill>
+          </a:ln>
+        </p:spPr>
+        <p:style>
+          <a:lnRef idx="2">
+            <a:schemeClr val="accent1">
+              <a:shade val="50000"/>
+            </a:schemeClr>
+          </a:lnRef>
+          <a:fillRef idx="1">
+            <a:schemeClr val="accent1"/>
+          </a:fillRef>
+          <a:effectRef idx="0">
+            <a:schemeClr val="accent1"/>
+          </a:effectRef>
+          <a:fontRef idx="minor">
+            <a:schemeClr val="lt1"/>
+          </a:fontRef>
+        </p:style>
+        <p:txBody>
+          <a:bodyPr rtlCol="0" anchor="ctr"/>
+          <a:lstStyle/>
+          <a:p>
+            <a:pPr algn="ctr"/>
+            <a:endParaRPr lang="pt-BR"/>
+          </a:p>
+        </p:txBody>
+      </p:sp>
     </p:spTree>
     <p:extLst>
       <p:ext uri="{BB962C8B-B14F-4D97-AF65-F5344CB8AC3E}">
@@ -9327,6 +9772,60 @@
             <a:endParaRPr lang="pt-BR" sz="1000">
               <a:cs typeface="Calibri"/>
             </a:endParaRPr>
+          </a:p>
+        </p:txBody>
+      </p:sp>
+      <p:sp>
+        <p:nvSpPr>
+          <p:cNvPr id="5" name="Retângulo 4">
+            <a:extLst>
+              <a:ext uri="{FF2B5EF4-FFF2-40B4-BE49-F238E27FC236}">
+                <a16:creationId xmlns:a16="http://schemas.microsoft.com/office/drawing/2014/main" id="{17A2B54E-8775-AE21-1A33-C9362524C18D}"/>
+              </a:ext>
+            </a:extLst>
+          </p:cNvPr>
+          <p:cNvSpPr/>
+          <p:nvPr/>
+        </p:nvSpPr>
+        <p:spPr>
+          <a:xfrm>
+            <a:off x="7243246" y="513952"/>
+            <a:ext cx="1458302" cy="944795"/>
+          </a:xfrm>
+          <a:prstGeom prst="rect">
+            <a:avLst/>
+          </a:prstGeom>
+          <a:solidFill>
+            <a:schemeClr val="bg1"/>
+          </a:solidFill>
+          <a:ln>
+            <a:solidFill>
+              <a:schemeClr val="bg1"/>
+            </a:solidFill>
+          </a:ln>
+        </p:spPr>
+        <p:style>
+          <a:lnRef idx="2">
+            <a:schemeClr val="accent1">
+              <a:shade val="50000"/>
+            </a:schemeClr>
+          </a:lnRef>
+          <a:fillRef idx="1">
+            <a:schemeClr val="accent1"/>
+          </a:fillRef>
+          <a:effectRef idx="0">
+            <a:schemeClr val="accent1"/>
+          </a:effectRef>
+          <a:fontRef idx="minor">
+            <a:schemeClr val="lt1"/>
+          </a:fontRef>
+        </p:style>
+        <p:txBody>
+          <a:bodyPr rtlCol="0" anchor="ctr"/>
+          <a:lstStyle/>
+          <a:p>
+            <a:pPr algn="ctr"/>
+            <a:endParaRPr lang="pt-BR"/>
           </a:p>
         </p:txBody>
       </p:sp>
@@ -10408,6 +10907,60 @@
           </a:p>
         </p:txBody>
       </p:sp>
+      <p:sp>
+        <p:nvSpPr>
+          <p:cNvPr id="13" name="Retângulo 12">
+            <a:extLst>
+              <a:ext uri="{FF2B5EF4-FFF2-40B4-BE49-F238E27FC236}">
+                <a16:creationId xmlns:a16="http://schemas.microsoft.com/office/drawing/2014/main" id="{EC9771DE-A100-58AA-4604-AF6D75E3718E}"/>
+              </a:ext>
+            </a:extLst>
+          </p:cNvPr>
+          <p:cNvSpPr/>
+          <p:nvPr/>
+        </p:nvSpPr>
+        <p:spPr>
+          <a:xfrm>
+            <a:off x="7243246" y="513952"/>
+            <a:ext cx="1458302" cy="944795"/>
+          </a:xfrm>
+          <a:prstGeom prst="rect">
+            <a:avLst/>
+          </a:prstGeom>
+          <a:solidFill>
+            <a:schemeClr val="bg1"/>
+          </a:solidFill>
+          <a:ln>
+            <a:solidFill>
+              <a:schemeClr val="bg1"/>
+            </a:solidFill>
+          </a:ln>
+        </p:spPr>
+        <p:style>
+          <a:lnRef idx="2">
+            <a:schemeClr val="accent1">
+              <a:shade val="50000"/>
+            </a:schemeClr>
+          </a:lnRef>
+          <a:fillRef idx="1">
+            <a:schemeClr val="accent1"/>
+          </a:fillRef>
+          <a:effectRef idx="0">
+            <a:schemeClr val="accent1"/>
+          </a:effectRef>
+          <a:fontRef idx="minor">
+            <a:schemeClr val="lt1"/>
+          </a:fontRef>
+        </p:style>
+        <p:txBody>
+          <a:bodyPr rtlCol="0" anchor="ctr"/>
+          <a:lstStyle/>
+          <a:p>
+            <a:pPr algn="ctr"/>
+            <a:endParaRPr lang="pt-BR"/>
+          </a:p>
+        </p:txBody>
+      </p:sp>
     </p:spTree>
     <p:extLst>
       <p:ext uri="{BB962C8B-B14F-4D97-AF65-F5344CB8AC3E}">
@@ -10965,6 +11518,60 @@
               </a:rPr>
               <a:t>Pseudocódigo: os algoritmos são representados através de códigos. Se assemelha ao modo como os programas são escritos.</a:t>
             </a:r>
+          </a:p>
+        </p:txBody>
+      </p:sp>
+      <p:sp>
+        <p:nvSpPr>
+          <p:cNvPr id="5" name="Retângulo 4">
+            <a:extLst>
+              <a:ext uri="{FF2B5EF4-FFF2-40B4-BE49-F238E27FC236}">
+                <a16:creationId xmlns:a16="http://schemas.microsoft.com/office/drawing/2014/main" id="{DFA86288-7930-2F75-AB69-205968584B92}"/>
+              </a:ext>
+            </a:extLst>
+          </p:cNvPr>
+          <p:cNvSpPr/>
+          <p:nvPr/>
+        </p:nvSpPr>
+        <p:spPr>
+          <a:xfrm>
+            <a:off x="7243246" y="513952"/>
+            <a:ext cx="1458302" cy="944795"/>
+          </a:xfrm>
+          <a:prstGeom prst="rect">
+            <a:avLst/>
+          </a:prstGeom>
+          <a:solidFill>
+            <a:schemeClr val="bg1"/>
+          </a:solidFill>
+          <a:ln>
+            <a:solidFill>
+              <a:schemeClr val="bg1"/>
+            </a:solidFill>
+          </a:ln>
+        </p:spPr>
+        <p:style>
+          <a:lnRef idx="2">
+            <a:schemeClr val="accent1">
+              <a:shade val="50000"/>
+            </a:schemeClr>
+          </a:lnRef>
+          <a:fillRef idx="1">
+            <a:schemeClr val="accent1"/>
+          </a:fillRef>
+          <a:effectRef idx="0">
+            <a:schemeClr val="accent1"/>
+          </a:effectRef>
+          <a:fontRef idx="minor">
+            <a:schemeClr val="lt1"/>
+          </a:fontRef>
+        </p:style>
+        <p:txBody>
+          <a:bodyPr rtlCol="0" anchor="ctr"/>
+          <a:lstStyle/>
+          <a:p>
+            <a:pPr algn="ctr"/>
+            <a:endParaRPr lang="pt-BR"/>
           </a:p>
         </p:txBody>
       </p:sp>
@@ -11569,6 +12176,60 @@
           </a:p>
         </p:txBody>
       </p:sp>
+      <p:sp>
+        <p:nvSpPr>
+          <p:cNvPr id="5" name="Retângulo 4">
+            <a:extLst>
+              <a:ext uri="{FF2B5EF4-FFF2-40B4-BE49-F238E27FC236}">
+                <a16:creationId xmlns:a16="http://schemas.microsoft.com/office/drawing/2014/main" id="{21FDA1E9-4429-48C2-8608-FF73613E5C34}"/>
+              </a:ext>
+            </a:extLst>
+          </p:cNvPr>
+          <p:cNvSpPr/>
+          <p:nvPr/>
+        </p:nvSpPr>
+        <p:spPr>
+          <a:xfrm>
+            <a:off x="7243246" y="513952"/>
+            <a:ext cx="1458302" cy="944795"/>
+          </a:xfrm>
+          <a:prstGeom prst="rect">
+            <a:avLst/>
+          </a:prstGeom>
+          <a:solidFill>
+            <a:schemeClr val="bg1"/>
+          </a:solidFill>
+          <a:ln>
+            <a:solidFill>
+              <a:schemeClr val="bg1"/>
+            </a:solidFill>
+          </a:ln>
+        </p:spPr>
+        <p:style>
+          <a:lnRef idx="2">
+            <a:schemeClr val="accent1">
+              <a:shade val="50000"/>
+            </a:schemeClr>
+          </a:lnRef>
+          <a:fillRef idx="1">
+            <a:schemeClr val="accent1"/>
+          </a:fillRef>
+          <a:effectRef idx="0">
+            <a:schemeClr val="accent1"/>
+          </a:effectRef>
+          <a:fontRef idx="minor">
+            <a:schemeClr val="lt1"/>
+          </a:fontRef>
+        </p:style>
+        <p:txBody>
+          <a:bodyPr rtlCol="0" anchor="ctr"/>
+          <a:lstStyle/>
+          <a:p>
+            <a:pPr algn="ctr"/>
+            <a:endParaRPr lang="pt-BR"/>
+          </a:p>
+        </p:txBody>
+      </p:sp>
     </p:spTree>
     <p:extLst>
       <p:ext uri="{BB962C8B-B14F-4D97-AF65-F5344CB8AC3E}">
@@ -12183,6 +12844,60 @@
               </a:rPr>
               <a:t>Calcular o resultado da divisão entre dois números</a:t>
             </a:r>
+          </a:p>
+        </p:txBody>
+      </p:sp>
+      <p:sp>
+        <p:nvSpPr>
+          <p:cNvPr id="5" name="Retângulo 4">
+            <a:extLst>
+              <a:ext uri="{FF2B5EF4-FFF2-40B4-BE49-F238E27FC236}">
+                <a16:creationId xmlns:a16="http://schemas.microsoft.com/office/drawing/2014/main" id="{23062201-600A-4469-D5A6-CFB4F47CDECD}"/>
+              </a:ext>
+            </a:extLst>
+          </p:cNvPr>
+          <p:cNvSpPr/>
+          <p:nvPr/>
+        </p:nvSpPr>
+        <p:spPr>
+          <a:xfrm>
+            <a:off x="7243246" y="513952"/>
+            <a:ext cx="1458302" cy="944795"/>
+          </a:xfrm>
+          <a:prstGeom prst="rect">
+            <a:avLst/>
+          </a:prstGeom>
+          <a:solidFill>
+            <a:schemeClr val="bg1"/>
+          </a:solidFill>
+          <a:ln>
+            <a:solidFill>
+              <a:schemeClr val="bg1"/>
+            </a:solidFill>
+          </a:ln>
+        </p:spPr>
+        <p:style>
+          <a:lnRef idx="2">
+            <a:schemeClr val="accent1">
+              <a:shade val="50000"/>
+            </a:schemeClr>
+          </a:lnRef>
+          <a:fillRef idx="1">
+            <a:schemeClr val="accent1"/>
+          </a:fillRef>
+          <a:effectRef idx="0">
+            <a:schemeClr val="accent1"/>
+          </a:effectRef>
+          <a:fontRef idx="minor">
+            <a:schemeClr val="lt1"/>
+          </a:fontRef>
+        </p:style>
+        <p:txBody>
+          <a:bodyPr rtlCol="0" anchor="ctr"/>
+          <a:lstStyle/>
+          <a:p>
+            <a:pPr algn="ctr"/>
+            <a:endParaRPr lang="pt-BR"/>
           </a:p>
         </p:txBody>
       </p:sp>

</xml_diff>